<commit_message>
remise sur le git le site et modification du diapo
</commit_message>
<xml_diff>
--- a/Diaporama/DIAPO_Florian.pptx
+++ b/Diaporama/DIAPO_Florian.pptx
@@ -3565,7 +3565,7 @@
           <a:p>
             <a:fld id="{2BE451C3-0FF4-47C4-B829-773ADF60F88C}" type="datetimeFigureOut">
               <a:rPr lang="en-US" smtClean="0"/>
-              <a:t>1/29/2020</a:t>
+              <a:t>2/4/2020</a:t>
             </a:fld>
             <a:endParaRPr lang="en-US" dirty="0"/>
           </a:p>
@@ -3780,7 +3780,7 @@
           <a:p>
             <a:fld id="{2BE451C3-0FF4-47C4-B829-773ADF60F88C}" type="datetimeFigureOut">
               <a:rPr lang="en-US" smtClean="0"/>
-              <a:t>1/29/2020</a:t>
+              <a:t>2/4/2020</a:t>
             </a:fld>
             <a:endParaRPr lang="en-US" dirty="0"/>
           </a:p>
@@ -4043,7 +4043,7 @@
           <a:p>
             <a:fld id="{2BE451C3-0FF4-47C4-B829-773ADF60F88C}" type="datetimeFigureOut">
               <a:rPr lang="en-US" smtClean="0"/>
-              <a:t>1/29/2020</a:t>
+              <a:t>2/4/2020</a:t>
             </a:fld>
             <a:endParaRPr lang="en-US" dirty="0"/>
           </a:p>
@@ -4224,7 +4224,7 @@
           <a:p>
             <a:fld id="{2BE451C3-0FF4-47C4-B829-773ADF60F88C}" type="datetimeFigureOut">
               <a:rPr lang="en-US" smtClean="0"/>
-              <a:t>1/29/2020</a:t>
+              <a:t>2/4/2020</a:t>
             </a:fld>
             <a:endParaRPr lang="en-US" dirty="0"/>
           </a:p>
@@ -4574,7 +4574,7 @@
           <a:p>
             <a:fld id="{2BE451C3-0FF4-47C4-B829-773ADF60F88C}" type="datetimeFigureOut">
               <a:rPr lang="en-US" smtClean="0"/>
-              <a:t>1/29/2020</a:t>
+              <a:t>2/4/2020</a:t>
             </a:fld>
             <a:endParaRPr lang="en-US" dirty="0"/>
           </a:p>
@@ -4856,7 +4856,7 @@
           <a:p>
             <a:fld id="{2BE451C3-0FF4-47C4-B829-773ADF60F88C}" type="datetimeFigureOut">
               <a:rPr lang="en-US" smtClean="0"/>
-              <a:t>1/29/2020</a:t>
+              <a:t>2/4/2020</a:t>
             </a:fld>
             <a:endParaRPr lang="en-US" dirty="0"/>
           </a:p>
@@ -5242,7 +5242,7 @@
           <a:p>
             <a:fld id="{2BE451C3-0FF4-47C4-B829-773ADF60F88C}" type="datetimeFigureOut">
               <a:rPr lang="en-US" smtClean="0"/>
-              <a:t>1/29/2020</a:t>
+              <a:t>2/4/2020</a:t>
             </a:fld>
             <a:endParaRPr lang="en-US" dirty="0"/>
           </a:p>
@@ -5367,7 +5367,7 @@
           <a:p>
             <a:fld id="{2BE451C3-0FF4-47C4-B829-773ADF60F88C}" type="datetimeFigureOut">
               <a:rPr lang="en-US" smtClean="0"/>
-              <a:t>1/29/2020</a:t>
+              <a:t>2/4/2020</a:t>
             </a:fld>
             <a:endParaRPr lang="en-US" dirty="0"/>
           </a:p>
@@ -5545,7 +5545,7 @@
           <a:p>
             <a:fld id="{2BE451C3-0FF4-47C4-B829-773ADF60F88C}" type="datetimeFigureOut">
               <a:rPr lang="en-US" smtClean="0"/>
-              <a:t>1/29/2020</a:t>
+              <a:t>2/4/2020</a:t>
             </a:fld>
             <a:endParaRPr lang="en-US" dirty="0"/>
           </a:p>
@@ -5906,7 +5906,7 @@
           <a:p>
             <a:fld id="{2BE451C3-0FF4-47C4-B829-773ADF60F88C}" type="datetimeFigureOut">
               <a:rPr lang="en-US" smtClean="0"/>
-              <a:t>1/29/2020</a:t>
+              <a:t>2/4/2020</a:t>
             </a:fld>
             <a:endParaRPr lang="en-US" dirty="0"/>
           </a:p>
@@ -6295,7 +6295,7 @@
           <a:p>
             <a:fld id="{2BE451C3-0FF4-47C4-B829-773ADF60F88C}" type="datetimeFigureOut">
               <a:rPr lang="en-US" smtClean="0"/>
-              <a:t>1/29/2020</a:t>
+              <a:t>2/4/2020</a:t>
             </a:fld>
             <a:endParaRPr lang="en-US" dirty="0"/>
           </a:p>
@@ -6589,7 +6589,7 @@
           <a:p>
             <a:fld id="{2BE451C3-0FF4-47C4-B829-773ADF60F88C}" type="datetimeFigureOut">
               <a:rPr lang="en-US" smtClean="0"/>
-              <a:t>1/29/2020</a:t>
+              <a:t>2/4/2020</a:t>
             </a:fld>
             <a:endParaRPr lang="en-US" dirty="0"/>
           </a:p>
@@ -7807,7 +7807,7 @@
         </p:blipFill>
         <p:spPr>
           <a:xfrm>
-            <a:off x="2489309" y="1881636"/>
+            <a:off x="2489309" y="1758294"/>
             <a:ext cx="6055289" cy="4416095"/>
           </a:xfrm>
           <a:prstGeom prst="rect">
@@ -7829,7 +7829,7 @@
         </p:nvSpPr>
         <p:spPr>
           <a:xfrm>
-            <a:off x="3483429" y="3135086"/>
+            <a:off x="3483429" y="2994645"/>
             <a:ext cx="1702525" cy="605247"/>
           </a:xfrm>
           <a:prstGeom prst="ellipse">
@@ -8093,6 +8093,58 @@
           </p:txBody>
         </p:sp>
       </p:grpSp>
+      <p:sp>
+        <p:nvSpPr>
+          <p:cNvPr id="12" name="Ellipse 11">
+            <a:extLst>
+              <a:ext uri="{FF2B5EF4-FFF2-40B4-BE49-F238E27FC236}">
+                <a16:creationId xmlns:a16="http://schemas.microsoft.com/office/drawing/2014/main" id="{BF507E4F-2E7C-4D37-AE97-0301E0B661D5}"/>
+              </a:ext>
+            </a:extLst>
+          </p:cNvPr>
+          <p:cNvSpPr/>
+          <p:nvPr/>
+        </p:nvSpPr>
+        <p:spPr>
+          <a:xfrm>
+            <a:off x="3483429" y="2994646"/>
+            <a:ext cx="1702525" cy="605247"/>
+          </a:xfrm>
+          <a:prstGeom prst="ellipse">
+            <a:avLst/>
+          </a:prstGeom>
+          <a:noFill/>
+          <a:ln>
+            <a:solidFill>
+              <a:schemeClr val="accent2"/>
+            </a:solidFill>
+          </a:ln>
+        </p:spPr>
+        <p:style>
+          <a:lnRef idx="2">
+            <a:schemeClr val="accent1">
+              <a:shade val="50000"/>
+            </a:schemeClr>
+          </a:lnRef>
+          <a:fillRef idx="1">
+            <a:schemeClr val="accent1"/>
+          </a:fillRef>
+          <a:effectRef idx="0">
+            <a:schemeClr val="accent1"/>
+          </a:effectRef>
+          <a:fontRef idx="minor">
+            <a:schemeClr val="lt1"/>
+          </a:fontRef>
+        </p:style>
+        <p:txBody>
+          <a:bodyPr rtlCol="0" anchor="ctr"/>
+          <a:lstStyle/>
+          <a:p>
+            <a:pPr algn="ctr"/>
+            <a:endParaRPr lang="fr-FR"/>
+          </a:p>
+        </p:txBody>
+      </p:sp>
     </p:spTree>
     <p:extLst>
       <p:ext uri="{BB962C8B-B14F-4D97-AF65-F5344CB8AC3E}">
@@ -8193,6 +8245,33 @@
                                   </p:childTnLst>
                                 </p:cTn>
                               </p:par>
+                              <p:par>
+                                <p:cTn id="11" presetID="1" presetClass="entr" presetSubtype="0" fill="hold" grpId="0" nodeType="withEffect">
+                                  <p:stCondLst>
+                                    <p:cond delay="0"/>
+                                  </p:stCondLst>
+                                  <p:childTnLst>
+                                    <p:set>
+                                      <p:cBhvr>
+                                        <p:cTn id="12" dur="1" fill="hold">
+                                          <p:stCondLst>
+                                            <p:cond delay="0"/>
+                                          </p:stCondLst>
+                                        </p:cTn>
+                                        <p:tgtEl>
+                                          <p:spTgt spid="12"/>
+                                        </p:tgtEl>
+                                        <p:attrNameLst>
+                                          <p:attrName>style.visibility</p:attrName>
+                                        </p:attrNameLst>
+                                      </p:cBhvr>
+                                      <p:to>
+                                        <p:strVal val="visible"/>
+                                      </p:to>
+                                    </p:set>
+                                  </p:childTnLst>
+                                </p:cTn>
+                              </p:par>
                             </p:childTnLst>
                           </p:cTn>
                         </p:par>
@@ -8222,6 +8301,7 @@
     </p:tnLst>
     <p:bldLst>
       <p:bldP spid="11" grpId="0" animBg="1"/>
+      <p:bldP spid="12" grpId="0" animBg="1"/>
     </p:bldLst>
   </p:timing>
 </p:sld>
@@ -8685,13 +8765,13 @@
   <p:clrMapOvr>
     <a:masterClrMapping/>
   </p:clrMapOvr>
-  <mc:AlternateContent xmlns:mc="http://schemas.openxmlformats.org/markup-compatibility/2006">
-    <mc:Choice xmlns:p159="http://schemas.microsoft.com/office/powerpoint/2015/09/main" Requires="p159">
+  <mc:AlternateContent xmlns:mc="http://schemas.openxmlformats.org/markup-compatibility/2006" xmlns:p159="http://schemas.microsoft.com/office/powerpoint/2015/09/main">
+    <mc:Choice Requires="p159">
       <p:transition xmlns:p14="http://schemas.microsoft.com/office/powerpoint/2010/main" spd="slow" p14:dur="2000">
         <p159:morph option="byObject"/>
       </p:transition>
     </mc:Choice>
-    <mc:Fallback>
+    <mc:Fallback xmlns="">
       <p:transition spd="slow">
         <p:fade/>
       </p:transition>
@@ -9340,6 +9420,343 @@
   <p:clrMapOvr>
     <a:masterClrMapping/>
   </p:clrMapOvr>
+  <p:timing>
+    <p:tnLst>
+      <p:par>
+        <p:cTn id="1" dur="indefinite" restart="never" nodeType="tmRoot">
+          <p:childTnLst>
+            <p:seq concurrent="1" nextAc="seek">
+              <p:cTn id="2" dur="indefinite" nodeType="mainSeq">
+                <p:childTnLst>
+                  <p:par>
+                    <p:cTn id="3" fill="hold">
+                      <p:stCondLst>
+                        <p:cond delay="indefinite"/>
+                        <p:cond evt="onBegin" delay="0">
+                          <p:tn val="2"/>
+                        </p:cond>
+                      </p:stCondLst>
+                      <p:childTnLst>
+                        <p:par>
+                          <p:cTn id="4" fill="hold">
+                            <p:stCondLst>
+                              <p:cond delay="0"/>
+                            </p:stCondLst>
+                            <p:childTnLst>
+                              <p:par>
+                                <p:cTn id="5" presetID="10" presetClass="entr" presetSubtype="0" fill="hold" nodeType="withEffect">
+                                  <p:stCondLst>
+                                    <p:cond delay="1000"/>
+                                  </p:stCondLst>
+                                  <p:childTnLst>
+                                    <p:set>
+                                      <p:cBhvr>
+                                        <p:cTn id="6" dur="1" fill="hold">
+                                          <p:stCondLst>
+                                            <p:cond delay="0"/>
+                                          </p:stCondLst>
+                                        </p:cTn>
+                                        <p:tgtEl>
+                                          <p:spTgt spid="12"/>
+                                        </p:tgtEl>
+                                        <p:attrNameLst>
+                                          <p:attrName>style.visibility</p:attrName>
+                                        </p:attrNameLst>
+                                      </p:cBhvr>
+                                      <p:to>
+                                        <p:strVal val="visible"/>
+                                      </p:to>
+                                    </p:set>
+                                    <p:animEffect transition="in" filter="fade">
+                                      <p:cBhvr>
+                                        <p:cTn id="7" dur="500"/>
+                                        <p:tgtEl>
+                                          <p:spTgt spid="12"/>
+                                        </p:tgtEl>
+                                      </p:cBhvr>
+                                    </p:animEffect>
+                                  </p:childTnLst>
+                                </p:cTn>
+                              </p:par>
+                              <p:par>
+                                <p:cTn id="8" presetID="10" presetClass="entr" presetSubtype="0" fill="hold" grpId="0" nodeType="withEffect">
+                                  <p:stCondLst>
+                                    <p:cond delay="1000"/>
+                                  </p:stCondLst>
+                                  <p:childTnLst>
+                                    <p:set>
+                                      <p:cBhvr>
+                                        <p:cTn id="9" dur="1" fill="hold">
+                                          <p:stCondLst>
+                                            <p:cond delay="0"/>
+                                          </p:stCondLst>
+                                        </p:cTn>
+                                        <p:tgtEl>
+                                          <p:spTgt spid="13"/>
+                                        </p:tgtEl>
+                                        <p:attrNameLst>
+                                          <p:attrName>style.visibility</p:attrName>
+                                        </p:attrNameLst>
+                                      </p:cBhvr>
+                                      <p:to>
+                                        <p:strVal val="visible"/>
+                                      </p:to>
+                                    </p:set>
+                                    <p:animEffect transition="in" filter="fade">
+                                      <p:cBhvr>
+                                        <p:cTn id="10" dur="500"/>
+                                        <p:tgtEl>
+                                          <p:spTgt spid="13"/>
+                                        </p:tgtEl>
+                                      </p:cBhvr>
+                                    </p:animEffect>
+                                  </p:childTnLst>
+                                </p:cTn>
+                              </p:par>
+                              <p:par>
+                                <p:cTn id="11" presetID="10" presetClass="entr" presetSubtype="0" fill="hold" nodeType="withEffect">
+                                  <p:stCondLst>
+                                    <p:cond delay="2000"/>
+                                  </p:stCondLst>
+                                  <p:childTnLst>
+                                    <p:set>
+                                      <p:cBhvr>
+                                        <p:cTn id="12" dur="1" fill="hold">
+                                          <p:stCondLst>
+                                            <p:cond delay="0"/>
+                                          </p:stCondLst>
+                                        </p:cTn>
+                                        <p:tgtEl>
+                                          <p:spTgt spid="16"/>
+                                        </p:tgtEl>
+                                        <p:attrNameLst>
+                                          <p:attrName>style.visibility</p:attrName>
+                                        </p:attrNameLst>
+                                      </p:cBhvr>
+                                      <p:to>
+                                        <p:strVal val="visible"/>
+                                      </p:to>
+                                    </p:set>
+                                    <p:animEffect transition="in" filter="fade">
+                                      <p:cBhvr>
+                                        <p:cTn id="13" dur="1000"/>
+                                        <p:tgtEl>
+                                          <p:spTgt spid="16"/>
+                                        </p:tgtEl>
+                                      </p:cBhvr>
+                                    </p:animEffect>
+                                  </p:childTnLst>
+                                </p:cTn>
+                              </p:par>
+                              <p:par>
+                                <p:cTn id="14" presetID="10" presetClass="entr" presetSubtype="0" fill="hold" grpId="0" nodeType="withEffect">
+                                  <p:stCondLst>
+                                    <p:cond delay="2000"/>
+                                  </p:stCondLst>
+                                  <p:childTnLst>
+                                    <p:set>
+                                      <p:cBhvr>
+                                        <p:cTn id="15" dur="1" fill="hold">
+                                          <p:stCondLst>
+                                            <p:cond delay="0"/>
+                                          </p:stCondLst>
+                                        </p:cTn>
+                                        <p:tgtEl>
+                                          <p:spTgt spid="17"/>
+                                        </p:tgtEl>
+                                        <p:attrNameLst>
+                                          <p:attrName>style.visibility</p:attrName>
+                                        </p:attrNameLst>
+                                      </p:cBhvr>
+                                      <p:to>
+                                        <p:strVal val="visible"/>
+                                      </p:to>
+                                    </p:set>
+                                    <p:animEffect transition="in" filter="fade">
+                                      <p:cBhvr>
+                                        <p:cTn id="16" dur="1000"/>
+                                        <p:tgtEl>
+                                          <p:spTgt spid="17"/>
+                                        </p:tgtEl>
+                                      </p:cBhvr>
+                                    </p:animEffect>
+                                  </p:childTnLst>
+                                </p:cTn>
+                              </p:par>
+                              <p:par>
+                                <p:cTn id="17" presetID="10" presetClass="entr" presetSubtype="0" fill="hold" nodeType="withEffect">
+                                  <p:stCondLst>
+                                    <p:cond delay="3000"/>
+                                  </p:stCondLst>
+                                  <p:childTnLst>
+                                    <p:set>
+                                      <p:cBhvr>
+                                        <p:cTn id="18" dur="1" fill="hold">
+                                          <p:stCondLst>
+                                            <p:cond delay="0"/>
+                                          </p:stCondLst>
+                                        </p:cTn>
+                                        <p:tgtEl>
+                                          <p:spTgt spid="22"/>
+                                        </p:tgtEl>
+                                        <p:attrNameLst>
+                                          <p:attrName>style.visibility</p:attrName>
+                                        </p:attrNameLst>
+                                      </p:cBhvr>
+                                      <p:to>
+                                        <p:strVal val="visible"/>
+                                      </p:to>
+                                    </p:set>
+                                    <p:animEffect transition="in" filter="fade">
+                                      <p:cBhvr>
+                                        <p:cTn id="19" dur="1000"/>
+                                        <p:tgtEl>
+                                          <p:spTgt spid="22"/>
+                                        </p:tgtEl>
+                                      </p:cBhvr>
+                                    </p:animEffect>
+                                  </p:childTnLst>
+                                </p:cTn>
+                              </p:par>
+                              <p:par>
+                                <p:cTn id="20" presetID="10" presetClass="entr" presetSubtype="0" fill="hold" grpId="0" nodeType="withEffect">
+                                  <p:stCondLst>
+                                    <p:cond delay="3000"/>
+                                  </p:stCondLst>
+                                  <p:childTnLst>
+                                    <p:set>
+                                      <p:cBhvr>
+                                        <p:cTn id="21" dur="1" fill="hold">
+                                          <p:stCondLst>
+                                            <p:cond delay="0"/>
+                                          </p:stCondLst>
+                                        </p:cTn>
+                                        <p:tgtEl>
+                                          <p:spTgt spid="23"/>
+                                        </p:tgtEl>
+                                        <p:attrNameLst>
+                                          <p:attrName>style.visibility</p:attrName>
+                                        </p:attrNameLst>
+                                      </p:cBhvr>
+                                      <p:to>
+                                        <p:strVal val="visible"/>
+                                      </p:to>
+                                    </p:set>
+                                    <p:animEffect transition="in" filter="fade">
+                                      <p:cBhvr>
+                                        <p:cTn id="22" dur="1000"/>
+                                        <p:tgtEl>
+                                          <p:spTgt spid="23"/>
+                                        </p:tgtEl>
+                                      </p:cBhvr>
+                                    </p:animEffect>
+                                  </p:childTnLst>
+                                </p:cTn>
+                              </p:par>
+                              <p:par>
+                                <p:cTn id="23" presetID="10" presetClass="entr" presetSubtype="0" fill="hold" nodeType="withEffect">
+                                  <p:stCondLst>
+                                    <p:cond delay="4000"/>
+                                  </p:stCondLst>
+                                  <p:childTnLst>
+                                    <p:set>
+                                      <p:cBhvr>
+                                        <p:cTn id="24" dur="1" fill="hold">
+                                          <p:stCondLst>
+                                            <p:cond delay="0"/>
+                                          </p:stCondLst>
+                                        </p:cTn>
+                                        <p:tgtEl>
+                                          <p:spTgt spid="27"/>
+                                        </p:tgtEl>
+                                        <p:attrNameLst>
+                                          <p:attrName>style.visibility</p:attrName>
+                                        </p:attrNameLst>
+                                      </p:cBhvr>
+                                      <p:to>
+                                        <p:strVal val="visible"/>
+                                      </p:to>
+                                    </p:set>
+                                    <p:animEffect transition="in" filter="fade">
+                                      <p:cBhvr>
+                                        <p:cTn id="25" dur="1000"/>
+                                        <p:tgtEl>
+                                          <p:spTgt spid="27"/>
+                                        </p:tgtEl>
+                                      </p:cBhvr>
+                                    </p:animEffect>
+                                  </p:childTnLst>
+                                </p:cTn>
+                              </p:par>
+                              <p:par>
+                                <p:cTn id="26" presetID="10" presetClass="entr" presetSubtype="0" fill="hold" grpId="0" nodeType="withEffect">
+                                  <p:stCondLst>
+                                    <p:cond delay="4000"/>
+                                  </p:stCondLst>
+                                  <p:childTnLst>
+                                    <p:set>
+                                      <p:cBhvr>
+                                        <p:cTn id="27" dur="1" fill="hold">
+                                          <p:stCondLst>
+                                            <p:cond delay="0"/>
+                                          </p:stCondLst>
+                                        </p:cTn>
+                                        <p:tgtEl>
+                                          <p:spTgt spid="28"/>
+                                        </p:tgtEl>
+                                        <p:attrNameLst>
+                                          <p:attrName>style.visibility</p:attrName>
+                                        </p:attrNameLst>
+                                      </p:cBhvr>
+                                      <p:to>
+                                        <p:strVal val="visible"/>
+                                      </p:to>
+                                    </p:set>
+                                    <p:animEffect transition="in" filter="fade">
+                                      <p:cBhvr>
+                                        <p:cTn id="28" dur="1000"/>
+                                        <p:tgtEl>
+                                          <p:spTgt spid="28"/>
+                                        </p:tgtEl>
+                                      </p:cBhvr>
+                                    </p:animEffect>
+                                  </p:childTnLst>
+                                </p:cTn>
+                              </p:par>
+                            </p:childTnLst>
+                          </p:cTn>
+                        </p:par>
+                      </p:childTnLst>
+                    </p:cTn>
+                  </p:par>
+                </p:childTnLst>
+              </p:cTn>
+              <p:prevCondLst>
+                <p:cond evt="onPrev" delay="0">
+                  <p:tgtEl>
+                    <p:sldTgt/>
+                  </p:tgtEl>
+                </p:cond>
+              </p:prevCondLst>
+              <p:nextCondLst>
+                <p:cond evt="onNext" delay="0">
+                  <p:tgtEl>
+                    <p:sldTgt/>
+                  </p:tgtEl>
+                </p:cond>
+              </p:nextCondLst>
+            </p:seq>
+          </p:childTnLst>
+        </p:cTn>
+      </p:par>
+    </p:tnLst>
+    <p:bldLst>
+      <p:bldP spid="13" grpId="0"/>
+      <p:bldP spid="17" grpId="0"/>
+      <p:bldP spid="23" grpId="0"/>
+      <p:bldP spid="28" grpId="0"/>
+    </p:bldLst>
+  </p:timing>
 </p:sld>
 </file>
 
@@ -9607,7 +10024,7 @@
         </p:blipFill>
         <p:spPr>
           <a:xfrm>
-            <a:off x="8046483" y="2385726"/>
+            <a:off x="8046483" y="1860703"/>
             <a:ext cx="4014477" cy="1642286"/>
           </a:xfrm>
           <a:prstGeom prst="rect">
@@ -9905,6 +10322,53 @@
           </p:txBody>
         </p:sp>
       </p:grpSp>
+      <p:pic>
+        <p:nvPicPr>
+          <p:cNvPr id="1026" name="Picture 2" descr="Résultat de recherche d'images pour &quot;netbeans&quot;">
+            <a:extLst>
+              <a:ext uri="{FF2B5EF4-FFF2-40B4-BE49-F238E27FC236}">
+                <a16:creationId xmlns:a16="http://schemas.microsoft.com/office/drawing/2014/main" id="{E96764F2-2B26-4B32-BB15-D6FDC92E44AA}"/>
+              </a:ext>
+            </a:extLst>
+          </p:cNvPr>
+          <p:cNvPicPr>
+            <a:picLocks noChangeAspect="1" noChangeArrowheads="1"/>
+          </p:cNvPicPr>
+          <p:nvPr/>
+        </p:nvPicPr>
+        <p:blipFill>
+          <a:blip r:embed="rId9">
+            <a:extLst>
+              <a:ext uri="{28A0092B-C50C-407E-A947-70E740481C1C}">
+                <a14:useLocalDpi xmlns:a14="http://schemas.microsoft.com/office/drawing/2010/main" val="0"/>
+              </a:ext>
+            </a:extLst>
+          </a:blip>
+          <a:srcRect/>
+          <a:stretch>
+            <a:fillRect/>
+          </a:stretch>
+        </p:blipFill>
+        <p:spPr bwMode="auto">
+          <a:xfrm>
+            <a:off x="8776378" y="3509281"/>
+            <a:ext cx="1990725" cy="2295525"/>
+          </a:xfrm>
+          <a:prstGeom prst="rect">
+            <a:avLst/>
+          </a:prstGeom>
+          <a:noFill/>
+          <a:extLst>
+            <a:ext uri="{909E8E84-426E-40DD-AFC4-6F175D3DCCD1}">
+              <a14:hiddenFill xmlns:a14="http://schemas.microsoft.com/office/drawing/2010/main">
+                <a:solidFill>
+                  <a:srgbClr val="FFFFFF"/>
+                </a:solidFill>
+              </a14:hiddenFill>
+            </a:ext>
+          </a:extLst>
+        </p:spPr>
+      </p:pic>
     </p:spTree>
     <p:extLst>
       <p:ext uri="{BB962C8B-B14F-4D97-AF65-F5344CB8AC3E}">
@@ -9915,6 +10379,270 @@
   <p:clrMapOvr>
     <a:masterClrMapping/>
   </p:clrMapOvr>
+  <p:timing>
+    <p:tnLst>
+      <p:par>
+        <p:cTn id="1" dur="indefinite" restart="never" nodeType="tmRoot">
+          <p:childTnLst>
+            <p:seq concurrent="1" nextAc="seek">
+              <p:cTn id="2" dur="indefinite" nodeType="mainSeq">
+                <p:childTnLst>
+                  <p:par>
+                    <p:cTn id="3" fill="hold">
+                      <p:stCondLst>
+                        <p:cond delay="indefinite"/>
+                        <p:cond evt="onBegin" delay="0">
+                          <p:tn val="2"/>
+                        </p:cond>
+                      </p:stCondLst>
+                      <p:childTnLst>
+                        <p:par>
+                          <p:cTn id="4" fill="hold">
+                            <p:stCondLst>
+                              <p:cond delay="0"/>
+                            </p:stCondLst>
+                            <p:childTnLst>
+                              <p:par>
+                                <p:cTn id="5" presetID="10" presetClass="entr" presetSubtype="0" fill="hold" nodeType="withEffect">
+                                  <p:stCondLst>
+                                    <p:cond delay="1250"/>
+                                  </p:stCondLst>
+                                  <p:childTnLst>
+                                    <p:set>
+                                      <p:cBhvr>
+                                        <p:cTn id="6" dur="1" fill="hold">
+                                          <p:stCondLst>
+                                            <p:cond delay="0"/>
+                                          </p:stCondLst>
+                                        </p:cTn>
+                                        <p:tgtEl>
+                                          <p:spTgt spid="10"/>
+                                        </p:tgtEl>
+                                        <p:attrNameLst>
+                                          <p:attrName>style.visibility</p:attrName>
+                                        </p:attrNameLst>
+                                      </p:cBhvr>
+                                      <p:to>
+                                        <p:strVal val="visible"/>
+                                      </p:to>
+                                    </p:set>
+                                    <p:animEffect transition="in" filter="fade">
+                                      <p:cBhvr>
+                                        <p:cTn id="7" dur="500"/>
+                                        <p:tgtEl>
+                                          <p:spTgt spid="10"/>
+                                        </p:tgtEl>
+                                      </p:cBhvr>
+                                    </p:animEffect>
+                                  </p:childTnLst>
+                                </p:cTn>
+                              </p:par>
+                              <p:par>
+                                <p:cTn id="8" presetID="10" presetClass="entr" presetSubtype="0" fill="hold" grpId="0" nodeType="withEffect">
+                                  <p:stCondLst>
+                                    <p:cond delay="1250"/>
+                                  </p:stCondLst>
+                                  <p:childTnLst>
+                                    <p:set>
+                                      <p:cBhvr>
+                                        <p:cTn id="9" dur="1" fill="hold">
+                                          <p:stCondLst>
+                                            <p:cond delay="0"/>
+                                          </p:stCondLst>
+                                        </p:cTn>
+                                        <p:tgtEl>
+                                          <p:spTgt spid="12"/>
+                                        </p:tgtEl>
+                                        <p:attrNameLst>
+                                          <p:attrName>style.visibility</p:attrName>
+                                        </p:attrNameLst>
+                                      </p:cBhvr>
+                                      <p:to>
+                                        <p:strVal val="visible"/>
+                                      </p:to>
+                                    </p:set>
+                                    <p:animEffect transition="in" filter="fade">
+                                      <p:cBhvr>
+                                        <p:cTn id="10" dur="500"/>
+                                        <p:tgtEl>
+                                          <p:spTgt spid="12"/>
+                                        </p:tgtEl>
+                                      </p:cBhvr>
+                                    </p:animEffect>
+                                  </p:childTnLst>
+                                </p:cTn>
+                              </p:par>
+                              <p:par>
+                                <p:cTn id="11" presetID="10" presetClass="entr" presetSubtype="0" fill="hold" nodeType="withEffect">
+                                  <p:stCondLst>
+                                    <p:cond delay="2250"/>
+                                  </p:stCondLst>
+                                  <p:childTnLst>
+                                    <p:set>
+                                      <p:cBhvr>
+                                        <p:cTn id="12" dur="1" fill="hold">
+                                          <p:stCondLst>
+                                            <p:cond delay="0"/>
+                                          </p:stCondLst>
+                                        </p:cTn>
+                                        <p:tgtEl>
+                                          <p:spTgt spid="21"/>
+                                        </p:tgtEl>
+                                        <p:attrNameLst>
+                                          <p:attrName>style.visibility</p:attrName>
+                                        </p:attrNameLst>
+                                      </p:cBhvr>
+                                      <p:to>
+                                        <p:strVal val="visible"/>
+                                      </p:to>
+                                    </p:set>
+                                    <p:animEffect transition="in" filter="fade">
+                                      <p:cBhvr>
+                                        <p:cTn id="13" dur="500"/>
+                                        <p:tgtEl>
+                                          <p:spTgt spid="21"/>
+                                        </p:tgtEl>
+                                      </p:cBhvr>
+                                    </p:animEffect>
+                                  </p:childTnLst>
+                                </p:cTn>
+                              </p:par>
+                              <p:par>
+                                <p:cTn id="14" presetID="10" presetClass="entr" presetSubtype="0" fill="hold" nodeType="withEffect">
+                                  <p:stCondLst>
+                                    <p:cond delay="2250"/>
+                                  </p:stCondLst>
+                                  <p:childTnLst>
+                                    <p:set>
+                                      <p:cBhvr>
+                                        <p:cTn id="15" dur="1" fill="hold">
+                                          <p:stCondLst>
+                                            <p:cond delay="0"/>
+                                          </p:stCondLst>
+                                        </p:cTn>
+                                        <p:tgtEl>
+                                          <p:spTgt spid="15"/>
+                                        </p:tgtEl>
+                                        <p:attrNameLst>
+                                          <p:attrName>style.visibility</p:attrName>
+                                        </p:attrNameLst>
+                                      </p:cBhvr>
+                                      <p:to>
+                                        <p:strVal val="visible"/>
+                                      </p:to>
+                                    </p:set>
+                                    <p:animEffect transition="in" filter="fade">
+                                      <p:cBhvr>
+                                        <p:cTn id="16" dur="500"/>
+                                        <p:tgtEl>
+                                          <p:spTgt spid="15"/>
+                                        </p:tgtEl>
+                                      </p:cBhvr>
+                                    </p:animEffect>
+                                  </p:childTnLst>
+                                </p:cTn>
+                              </p:par>
+                              <p:par>
+                                <p:cTn id="17" presetID="10" presetClass="entr" presetSubtype="0" fill="hold" nodeType="withEffect">
+                                  <p:stCondLst>
+                                    <p:cond delay="3000"/>
+                                  </p:stCondLst>
+                                  <p:childTnLst>
+                                    <p:set>
+                                      <p:cBhvr>
+                                        <p:cTn id="18" dur="1" fill="hold">
+                                          <p:stCondLst>
+                                            <p:cond delay="0"/>
+                                          </p:stCondLst>
+                                        </p:cTn>
+                                        <p:tgtEl>
+                                          <p:spTgt spid="18"/>
+                                        </p:tgtEl>
+                                        <p:attrNameLst>
+                                          <p:attrName>style.visibility</p:attrName>
+                                        </p:attrNameLst>
+                                      </p:cBhvr>
+                                      <p:to>
+                                        <p:strVal val="visible"/>
+                                      </p:to>
+                                    </p:set>
+                                    <p:animEffect transition="in" filter="fade">
+                                      <p:cBhvr>
+                                        <p:cTn id="19" dur="500"/>
+                                        <p:tgtEl>
+                                          <p:spTgt spid="18"/>
+                                        </p:tgtEl>
+                                      </p:cBhvr>
+                                    </p:animEffect>
+                                  </p:childTnLst>
+                                </p:cTn>
+                              </p:par>
+                              <p:par>
+                                <p:cTn id="20" presetID="10" presetClass="entr" presetSubtype="0" fill="hold" nodeType="withEffect">
+                                  <p:stCondLst>
+                                    <p:cond delay="3000"/>
+                                  </p:stCondLst>
+                                  <p:childTnLst>
+                                    <p:set>
+                                      <p:cBhvr>
+                                        <p:cTn id="21" dur="1" fill="hold">
+                                          <p:stCondLst>
+                                            <p:cond delay="0"/>
+                                          </p:stCondLst>
+                                        </p:cTn>
+                                        <p:tgtEl>
+                                          <p:spTgt spid="1026"/>
+                                        </p:tgtEl>
+                                        <p:attrNameLst>
+                                          <p:attrName>style.visibility</p:attrName>
+                                        </p:attrNameLst>
+                                      </p:cBhvr>
+                                      <p:to>
+                                        <p:strVal val="visible"/>
+                                      </p:to>
+                                    </p:set>
+                                    <p:animEffect transition="in" filter="fade">
+                                      <p:cBhvr>
+                                        <p:cTn id="22" dur="500"/>
+                                        <p:tgtEl>
+                                          <p:spTgt spid="1026"/>
+                                        </p:tgtEl>
+                                      </p:cBhvr>
+                                    </p:animEffect>
+                                  </p:childTnLst>
+                                </p:cTn>
+                              </p:par>
+                            </p:childTnLst>
+                          </p:cTn>
+                        </p:par>
+                      </p:childTnLst>
+                    </p:cTn>
+                  </p:par>
+                </p:childTnLst>
+              </p:cTn>
+              <p:prevCondLst>
+                <p:cond evt="onPrev" delay="0">
+                  <p:tgtEl>
+                    <p:sldTgt/>
+                  </p:tgtEl>
+                </p:cond>
+              </p:prevCondLst>
+              <p:nextCondLst>
+                <p:cond evt="onNext" delay="0">
+                  <p:tgtEl>
+                    <p:sldTgt/>
+                  </p:tgtEl>
+                </p:cond>
+              </p:nextCondLst>
+            </p:seq>
+          </p:childTnLst>
+        </p:cTn>
+      </p:par>
+    </p:tnLst>
+    <p:bldLst>
+      <p:bldP spid="12" grpId="0"/>
+    </p:bldLst>
+  </p:timing>
 </p:sld>
 </file>
 
@@ -12822,6 +13550,58 @@
           </p:txBody>
         </p:sp>
       </p:grpSp>
+      <p:sp>
+        <p:nvSpPr>
+          <p:cNvPr id="4" name="Rectangle 3">
+            <a:extLst>
+              <a:ext uri="{FF2B5EF4-FFF2-40B4-BE49-F238E27FC236}">
+                <a16:creationId xmlns:a16="http://schemas.microsoft.com/office/drawing/2014/main" id="{D4525347-C098-4B07-BEA0-B8D4F4E60B62}"/>
+              </a:ext>
+            </a:extLst>
+          </p:cNvPr>
+          <p:cNvSpPr/>
+          <p:nvPr/>
+        </p:nvSpPr>
+        <p:spPr>
+          <a:xfrm>
+            <a:off x="886345" y="1375794"/>
+            <a:ext cx="6407526" cy="2449572"/>
+          </a:xfrm>
+          <a:prstGeom prst="rect">
+            <a:avLst/>
+          </a:prstGeom>
+          <a:noFill/>
+          <a:ln w="57150">
+            <a:solidFill>
+              <a:srgbClr val="C00000"/>
+            </a:solidFill>
+          </a:ln>
+        </p:spPr>
+        <p:style>
+          <a:lnRef idx="2">
+            <a:schemeClr val="accent1">
+              <a:shade val="50000"/>
+            </a:schemeClr>
+          </a:lnRef>
+          <a:fillRef idx="1">
+            <a:schemeClr val="accent1"/>
+          </a:fillRef>
+          <a:effectRef idx="0">
+            <a:schemeClr val="accent1"/>
+          </a:effectRef>
+          <a:fontRef idx="minor">
+            <a:schemeClr val="lt1"/>
+          </a:fontRef>
+        </p:style>
+        <p:txBody>
+          <a:bodyPr rtlCol="0" anchor="ctr"/>
+          <a:lstStyle/>
+          <a:p>
+            <a:pPr algn="ctr"/>
+            <a:endParaRPr lang="fr-FR"/>
+          </a:p>
+        </p:txBody>
+      </p:sp>
     </p:spTree>
     <p:extLst>
       <p:ext uri="{BB962C8B-B14F-4D97-AF65-F5344CB8AC3E}">
@@ -12832,6 +13612,84 @@
   <p:clrMapOvr>
     <a:masterClrMapping/>
   </p:clrMapOvr>
+  <p:timing>
+    <p:tnLst>
+      <p:par>
+        <p:cTn id="1" dur="indefinite" restart="never" nodeType="tmRoot">
+          <p:childTnLst>
+            <p:seq concurrent="1" nextAc="seek">
+              <p:cTn id="2" dur="indefinite" nodeType="mainSeq">
+                <p:childTnLst>
+                  <p:par>
+                    <p:cTn id="3" fill="hold">
+                      <p:stCondLst>
+                        <p:cond delay="indefinite"/>
+                      </p:stCondLst>
+                      <p:childTnLst>
+                        <p:par>
+                          <p:cTn id="4" fill="hold">
+                            <p:stCondLst>
+                              <p:cond delay="0"/>
+                            </p:stCondLst>
+                            <p:childTnLst>
+                              <p:par>
+                                <p:cTn id="5" presetID="1" presetClass="entr" presetSubtype="0" fill="hold" grpId="0" nodeType="clickEffect">
+                                  <p:stCondLst>
+                                    <p:cond delay="0"/>
+                                  </p:stCondLst>
+                                  <p:childTnLst>
+                                    <p:set>
+                                      <p:cBhvr>
+                                        <p:cTn id="6" dur="1" fill="hold">
+                                          <p:stCondLst>
+                                            <p:cond delay="0"/>
+                                          </p:stCondLst>
+                                        </p:cTn>
+                                        <p:tgtEl>
+                                          <p:spTgt spid="4"/>
+                                        </p:tgtEl>
+                                        <p:attrNameLst>
+                                          <p:attrName>style.visibility</p:attrName>
+                                        </p:attrNameLst>
+                                      </p:cBhvr>
+                                      <p:to>
+                                        <p:strVal val="visible"/>
+                                      </p:to>
+                                    </p:set>
+                                  </p:childTnLst>
+                                </p:cTn>
+                              </p:par>
+                            </p:childTnLst>
+                          </p:cTn>
+                        </p:par>
+                      </p:childTnLst>
+                    </p:cTn>
+                  </p:par>
+                </p:childTnLst>
+              </p:cTn>
+              <p:prevCondLst>
+                <p:cond evt="onPrev" delay="0">
+                  <p:tgtEl>
+                    <p:sldTgt/>
+                  </p:tgtEl>
+                </p:cond>
+              </p:prevCondLst>
+              <p:nextCondLst>
+                <p:cond evt="onNext" delay="0">
+                  <p:tgtEl>
+                    <p:sldTgt/>
+                  </p:tgtEl>
+                </p:cond>
+              </p:nextCondLst>
+            </p:seq>
+          </p:childTnLst>
+        </p:cTn>
+      </p:par>
+    </p:tnLst>
+    <p:bldLst>
+      <p:bldP spid="4" grpId="0" animBg="1"/>
+    </p:bldLst>
+  </p:timing>
 </p:sld>
 </file>
 
@@ -16231,6 +17089,281 @@
   <p:clrMapOvr>
     <a:masterClrMapping/>
   </p:clrMapOvr>
+  <p:timing>
+    <p:tnLst>
+      <p:par>
+        <p:cTn id="1" dur="indefinite" restart="never" nodeType="tmRoot">
+          <p:childTnLst>
+            <p:seq concurrent="1" nextAc="seek">
+              <p:cTn id="2" dur="indefinite" nodeType="mainSeq">
+                <p:childTnLst>
+                  <p:par>
+                    <p:cTn id="3" fill="hold">
+                      <p:stCondLst>
+                        <p:cond delay="indefinite"/>
+                      </p:stCondLst>
+                      <p:childTnLst>
+                        <p:par>
+                          <p:cTn id="4" fill="hold">
+                            <p:stCondLst>
+                              <p:cond delay="0"/>
+                            </p:stCondLst>
+                            <p:childTnLst>
+                              <p:par>
+                                <p:cTn id="5" presetID="1" presetClass="entr" presetSubtype="0" fill="hold" nodeType="clickEffect">
+                                  <p:stCondLst>
+                                    <p:cond delay="0"/>
+                                  </p:stCondLst>
+                                  <p:childTnLst>
+                                    <p:set>
+                                      <p:cBhvr>
+                                        <p:cTn id="6" dur="1" fill="hold">
+                                          <p:stCondLst>
+                                            <p:cond delay="0"/>
+                                          </p:stCondLst>
+                                        </p:cTn>
+                                        <p:tgtEl>
+                                          <p:spTgt spid="13">
+                                            <p:txEl>
+                                              <p:pRg st="0" end="0"/>
+                                            </p:txEl>
+                                          </p:spTgt>
+                                        </p:tgtEl>
+                                        <p:attrNameLst>
+                                          <p:attrName>style.visibility</p:attrName>
+                                        </p:attrNameLst>
+                                      </p:cBhvr>
+                                      <p:to>
+                                        <p:strVal val="visible"/>
+                                      </p:to>
+                                    </p:set>
+                                  </p:childTnLst>
+                                </p:cTn>
+                              </p:par>
+                            </p:childTnLst>
+                          </p:cTn>
+                        </p:par>
+                      </p:childTnLst>
+                    </p:cTn>
+                  </p:par>
+                  <p:par>
+                    <p:cTn id="7" fill="hold">
+                      <p:stCondLst>
+                        <p:cond delay="indefinite"/>
+                      </p:stCondLst>
+                      <p:childTnLst>
+                        <p:par>
+                          <p:cTn id="8" fill="hold">
+                            <p:stCondLst>
+                              <p:cond delay="0"/>
+                            </p:stCondLst>
+                            <p:childTnLst>
+                              <p:par>
+                                <p:cTn id="9" presetID="1" presetClass="entr" presetSubtype="0" fill="hold" nodeType="clickEffect">
+                                  <p:stCondLst>
+                                    <p:cond delay="0"/>
+                                  </p:stCondLst>
+                                  <p:childTnLst>
+                                    <p:set>
+                                      <p:cBhvr>
+                                        <p:cTn id="10" dur="1" fill="hold">
+                                          <p:stCondLst>
+                                            <p:cond delay="0"/>
+                                          </p:stCondLst>
+                                        </p:cTn>
+                                        <p:tgtEl>
+                                          <p:spTgt spid="13">
+                                            <p:txEl>
+                                              <p:pRg st="1" end="1"/>
+                                            </p:txEl>
+                                          </p:spTgt>
+                                        </p:tgtEl>
+                                        <p:attrNameLst>
+                                          <p:attrName>style.visibility</p:attrName>
+                                        </p:attrNameLst>
+                                      </p:cBhvr>
+                                      <p:to>
+                                        <p:strVal val="visible"/>
+                                      </p:to>
+                                    </p:set>
+                                  </p:childTnLst>
+                                </p:cTn>
+                              </p:par>
+                            </p:childTnLst>
+                          </p:cTn>
+                        </p:par>
+                      </p:childTnLst>
+                    </p:cTn>
+                  </p:par>
+                  <p:par>
+                    <p:cTn id="11" fill="hold">
+                      <p:stCondLst>
+                        <p:cond delay="indefinite"/>
+                      </p:stCondLst>
+                      <p:childTnLst>
+                        <p:par>
+                          <p:cTn id="12" fill="hold">
+                            <p:stCondLst>
+                              <p:cond delay="0"/>
+                            </p:stCondLst>
+                            <p:childTnLst>
+                              <p:par>
+                                <p:cTn id="13" presetID="1" presetClass="entr" presetSubtype="0" fill="hold" nodeType="clickEffect">
+                                  <p:stCondLst>
+                                    <p:cond delay="0"/>
+                                  </p:stCondLst>
+                                  <p:childTnLst>
+                                    <p:set>
+                                      <p:cBhvr>
+                                        <p:cTn id="14" dur="1" fill="hold">
+                                          <p:stCondLst>
+                                            <p:cond delay="0"/>
+                                          </p:stCondLst>
+                                        </p:cTn>
+                                        <p:tgtEl>
+                                          <p:spTgt spid="13">
+                                            <p:txEl>
+                                              <p:pRg st="2" end="2"/>
+                                            </p:txEl>
+                                          </p:spTgt>
+                                        </p:tgtEl>
+                                        <p:attrNameLst>
+                                          <p:attrName>style.visibility</p:attrName>
+                                        </p:attrNameLst>
+                                      </p:cBhvr>
+                                      <p:to>
+                                        <p:strVal val="visible"/>
+                                      </p:to>
+                                    </p:set>
+                                  </p:childTnLst>
+                                </p:cTn>
+                              </p:par>
+                            </p:childTnLst>
+                          </p:cTn>
+                        </p:par>
+                      </p:childTnLst>
+                    </p:cTn>
+                  </p:par>
+                  <p:par>
+                    <p:cTn id="15" fill="hold">
+                      <p:stCondLst>
+                        <p:cond delay="indefinite"/>
+                      </p:stCondLst>
+                      <p:childTnLst>
+                        <p:par>
+                          <p:cTn id="16" fill="hold">
+                            <p:stCondLst>
+                              <p:cond delay="0"/>
+                            </p:stCondLst>
+                            <p:childTnLst>
+                              <p:par>
+                                <p:cTn id="17" presetID="1" presetClass="entr" presetSubtype="0" fill="hold" nodeType="clickEffect">
+                                  <p:stCondLst>
+                                    <p:cond delay="0"/>
+                                  </p:stCondLst>
+                                  <p:childTnLst>
+                                    <p:set>
+                                      <p:cBhvr>
+                                        <p:cTn id="18" dur="1" fill="hold">
+                                          <p:stCondLst>
+                                            <p:cond delay="0"/>
+                                          </p:stCondLst>
+                                        </p:cTn>
+                                        <p:tgtEl>
+                                          <p:spTgt spid="13">
+                                            <p:txEl>
+                                              <p:pRg st="3" end="3"/>
+                                            </p:txEl>
+                                          </p:spTgt>
+                                        </p:tgtEl>
+                                        <p:attrNameLst>
+                                          <p:attrName>style.visibility</p:attrName>
+                                        </p:attrNameLst>
+                                      </p:cBhvr>
+                                      <p:to>
+                                        <p:strVal val="visible"/>
+                                      </p:to>
+                                    </p:set>
+                                  </p:childTnLst>
+                                </p:cTn>
+                              </p:par>
+                            </p:childTnLst>
+                          </p:cTn>
+                        </p:par>
+                      </p:childTnLst>
+                    </p:cTn>
+                  </p:par>
+                  <p:par>
+                    <p:cTn id="19" fill="hold">
+                      <p:stCondLst>
+                        <p:cond delay="indefinite"/>
+                      </p:stCondLst>
+                      <p:childTnLst>
+                        <p:par>
+                          <p:cTn id="20" fill="hold">
+                            <p:stCondLst>
+                              <p:cond delay="0"/>
+                            </p:stCondLst>
+                            <p:childTnLst>
+                              <p:par>
+                                <p:cTn id="21" presetID="1" presetClass="entr" presetSubtype="0" fill="hold" nodeType="clickEffect">
+                                  <p:stCondLst>
+                                    <p:cond delay="0"/>
+                                  </p:stCondLst>
+                                  <p:childTnLst>
+                                    <p:set>
+                                      <p:cBhvr>
+                                        <p:cTn id="22" dur="1" fill="hold">
+                                          <p:stCondLst>
+                                            <p:cond delay="0"/>
+                                          </p:stCondLst>
+                                        </p:cTn>
+                                        <p:tgtEl>
+                                          <p:spTgt spid="13">
+                                            <p:txEl>
+                                              <p:pRg st="4" end="4"/>
+                                            </p:txEl>
+                                          </p:spTgt>
+                                        </p:tgtEl>
+                                        <p:attrNameLst>
+                                          <p:attrName>style.visibility</p:attrName>
+                                        </p:attrNameLst>
+                                      </p:cBhvr>
+                                      <p:to>
+                                        <p:strVal val="visible"/>
+                                      </p:to>
+                                    </p:set>
+                                  </p:childTnLst>
+                                </p:cTn>
+                              </p:par>
+                            </p:childTnLst>
+                          </p:cTn>
+                        </p:par>
+                      </p:childTnLst>
+                    </p:cTn>
+                  </p:par>
+                </p:childTnLst>
+              </p:cTn>
+              <p:prevCondLst>
+                <p:cond evt="onPrev" delay="0">
+                  <p:tgtEl>
+                    <p:sldTgt/>
+                  </p:tgtEl>
+                </p:cond>
+              </p:prevCondLst>
+              <p:nextCondLst>
+                <p:cond evt="onNext" delay="0">
+                  <p:tgtEl>
+                    <p:sldTgt/>
+                  </p:tgtEl>
+                </p:cond>
+              </p:nextCondLst>
+            </p:seq>
+          </p:childTnLst>
+        </p:cTn>
+      </p:par>
+    </p:tnLst>
+  </p:timing>
 </p:sld>
 </file>
 

</xml_diff>